<commit_message>
added start of top-level ont diag
</commit_message>
<xml_diff>
--- a/Digiscape Top Level Provenance Template.pptx
+++ b/Digiscape Top Level Provenance Template.pptx
@@ -12,6 +12,7 @@
     <p:sldId id="258" r:id="rId6"/>
     <p:sldId id="261" r:id="rId7"/>
     <p:sldId id="262" r:id="rId8"/>
+    <p:sldId id="263" r:id="rId9"/>
   </p:sldIdLst>
   <p:sldSz cx="12192000" cy="6858000"/>
   <p:notesSz cx="6858000" cy="9144000"/>
@@ -249,7 +250,7 @@
           <a:p>
             <a:fld id="{1AAFCBB7-075C-41D9-AAD4-A4CBA0471A5B}" type="datetimeFigureOut">
               <a:rPr lang="en-AU" smtClean="0"/>
-              <a:t>9/02/2018</a:t>
+              <a:t>2/5/18</a:t>
             </a:fld>
             <a:endParaRPr lang="en-AU"/>
           </a:p>
@@ -419,7 +420,7 @@
           <a:p>
             <a:fld id="{1AAFCBB7-075C-41D9-AAD4-A4CBA0471A5B}" type="datetimeFigureOut">
               <a:rPr lang="en-AU" smtClean="0"/>
-              <a:t>9/02/2018</a:t>
+              <a:t>2/5/18</a:t>
             </a:fld>
             <a:endParaRPr lang="en-AU"/>
           </a:p>
@@ -599,7 +600,7 @@
           <a:p>
             <a:fld id="{1AAFCBB7-075C-41D9-AAD4-A4CBA0471A5B}" type="datetimeFigureOut">
               <a:rPr lang="en-AU" smtClean="0"/>
-              <a:t>9/02/2018</a:t>
+              <a:t>2/5/18</a:t>
             </a:fld>
             <a:endParaRPr lang="en-AU"/>
           </a:p>
@@ -769,7 +770,7 @@
           <a:p>
             <a:fld id="{1AAFCBB7-075C-41D9-AAD4-A4CBA0471A5B}" type="datetimeFigureOut">
               <a:rPr lang="en-AU" smtClean="0"/>
-              <a:t>9/02/2018</a:t>
+              <a:t>2/5/18</a:t>
             </a:fld>
             <a:endParaRPr lang="en-AU"/>
           </a:p>
@@ -1015,7 +1016,7 @@
           <a:p>
             <a:fld id="{1AAFCBB7-075C-41D9-AAD4-A4CBA0471A5B}" type="datetimeFigureOut">
               <a:rPr lang="en-AU" smtClean="0"/>
-              <a:t>9/02/2018</a:t>
+              <a:t>2/5/18</a:t>
             </a:fld>
             <a:endParaRPr lang="en-AU"/>
           </a:p>
@@ -1247,7 +1248,7 @@
           <a:p>
             <a:fld id="{1AAFCBB7-075C-41D9-AAD4-A4CBA0471A5B}" type="datetimeFigureOut">
               <a:rPr lang="en-AU" smtClean="0"/>
-              <a:t>9/02/2018</a:t>
+              <a:t>2/5/18</a:t>
             </a:fld>
             <a:endParaRPr lang="en-AU"/>
           </a:p>
@@ -1614,7 +1615,7 @@
           <a:p>
             <a:fld id="{1AAFCBB7-075C-41D9-AAD4-A4CBA0471A5B}" type="datetimeFigureOut">
               <a:rPr lang="en-AU" smtClean="0"/>
-              <a:t>9/02/2018</a:t>
+              <a:t>2/5/18</a:t>
             </a:fld>
             <a:endParaRPr lang="en-AU"/>
           </a:p>
@@ -1732,7 +1733,7 @@
           <a:p>
             <a:fld id="{1AAFCBB7-075C-41D9-AAD4-A4CBA0471A5B}" type="datetimeFigureOut">
               <a:rPr lang="en-AU" smtClean="0"/>
-              <a:t>9/02/2018</a:t>
+              <a:t>2/5/18</a:t>
             </a:fld>
             <a:endParaRPr lang="en-AU"/>
           </a:p>
@@ -1827,7 +1828,7 @@
           <a:p>
             <a:fld id="{1AAFCBB7-075C-41D9-AAD4-A4CBA0471A5B}" type="datetimeFigureOut">
               <a:rPr lang="en-AU" smtClean="0"/>
-              <a:t>9/02/2018</a:t>
+              <a:t>2/5/18</a:t>
             </a:fld>
             <a:endParaRPr lang="en-AU"/>
           </a:p>
@@ -2104,7 +2105,7 @@
           <a:p>
             <a:fld id="{1AAFCBB7-075C-41D9-AAD4-A4CBA0471A5B}" type="datetimeFigureOut">
               <a:rPr lang="en-AU" smtClean="0"/>
-              <a:t>9/02/2018</a:t>
+              <a:t>2/5/18</a:t>
             </a:fld>
             <a:endParaRPr lang="en-AU"/>
           </a:p>
@@ -2357,7 +2358,7 @@
           <a:p>
             <a:fld id="{1AAFCBB7-075C-41D9-AAD4-A4CBA0471A5B}" type="datetimeFigureOut">
               <a:rPr lang="en-AU" smtClean="0"/>
-              <a:t>9/02/2018</a:t>
+              <a:t>2/5/18</a:t>
             </a:fld>
             <a:endParaRPr lang="en-AU"/>
           </a:p>
@@ -2570,7 +2571,7 @@
           <a:p>
             <a:fld id="{1AAFCBB7-075C-41D9-AAD4-A4CBA0471A5B}" type="datetimeFigureOut">
               <a:rPr lang="en-AU" smtClean="0"/>
-              <a:t>9/02/2018</a:t>
+              <a:t>2/5/18</a:t>
             </a:fld>
             <a:endParaRPr lang="en-AU"/>
           </a:p>
@@ -3028,10 +3029,9 @@
           <a:lstStyle/>
           <a:p>
             <a:r>
-              <a:rPr lang="en-AU" dirty="0" smtClean="0"/>
+              <a:rPr lang="en-AU" dirty="0"/>
               <a:t>Conflux architecture</a:t>
             </a:r>
-            <a:endParaRPr lang="en-AU" dirty="0"/>
           </a:p>
         </p:txBody>
       </p:sp>
@@ -3082,18 +3082,13 @@
           <a:p>
             <a:pPr algn="ctr"/>
             <a:r>
-              <a:rPr lang="en-AU" sz="1100" dirty="0" smtClean="0">
+              <a:rPr lang="en-AU" sz="1100" dirty="0">
                 <a:solidFill>
                   <a:schemeClr val="tx1"/>
                 </a:solidFill>
               </a:rPr>
               <a:t>Entity</a:t>
             </a:r>
-            <a:endParaRPr lang="en-AU" sz="1100" dirty="0">
-              <a:solidFill>
-                <a:schemeClr val="tx1"/>
-              </a:solidFill>
-            </a:endParaRPr>
           </a:p>
         </p:txBody>
       </p:sp>
@@ -3144,18 +3139,13 @@
           <a:p>
             <a:pPr algn="ctr"/>
             <a:r>
-              <a:rPr lang="en-AU" sz="1100" dirty="0" smtClean="0">
+              <a:rPr lang="en-AU" sz="1100" dirty="0">
                 <a:solidFill>
                   <a:schemeClr val="tx1"/>
                 </a:solidFill>
               </a:rPr>
               <a:t>Activity</a:t>
             </a:r>
-            <a:endParaRPr lang="en-AU" sz="1100" dirty="0">
-              <a:solidFill>
-                <a:schemeClr val="tx1"/>
-              </a:solidFill>
-            </a:endParaRPr>
           </a:p>
         </p:txBody>
       </p:sp>
@@ -3257,18 +3247,13 @@
           <a:p>
             <a:pPr algn="ctr"/>
             <a:r>
-              <a:rPr lang="en-AU" sz="1100" dirty="0" smtClean="0">
+              <a:rPr lang="en-AU" sz="1100" dirty="0">
                 <a:solidFill>
                   <a:schemeClr val="tx1"/>
                 </a:solidFill>
               </a:rPr>
               <a:t>Agent</a:t>
             </a:r>
-            <a:endParaRPr lang="en-AU" sz="1100" dirty="0">
-              <a:solidFill>
-                <a:schemeClr val="tx1"/>
-              </a:solidFill>
-            </a:endParaRPr>
           </a:p>
         </p:txBody>
       </p:sp>
@@ -3295,10 +3280,9 @@
           <a:lstStyle/>
           <a:p>
             <a:r>
-              <a:rPr lang="en-AU" sz="1400" u="sng" dirty="0" smtClean="0"/>
+              <a:rPr lang="en-AU" sz="1400" u="sng" dirty="0"/>
               <a:t>PROV-O Classes</a:t>
             </a:r>
-            <a:endParaRPr lang="en-AU" sz="1400" u="sng" dirty="0"/>
           </a:p>
         </p:txBody>
       </p:sp>
@@ -3349,18 +3333,13 @@
           <a:p>
             <a:pPr algn="ctr"/>
             <a:r>
-              <a:rPr lang="en-AU" sz="1100" dirty="0" smtClean="0">
+              <a:rPr lang="en-AU" sz="1100" dirty="0">
                 <a:solidFill>
                   <a:schemeClr val="tx1"/>
                 </a:solidFill>
               </a:rPr>
               <a:t>Source Datasets</a:t>
             </a:r>
-            <a:endParaRPr lang="en-AU" sz="1100" dirty="0">
-              <a:solidFill>
-                <a:schemeClr val="tx1"/>
-              </a:solidFill>
-            </a:endParaRPr>
           </a:p>
         </p:txBody>
       </p:sp>
@@ -3497,18 +3476,13 @@
           <a:p>
             <a:pPr algn="ctr"/>
             <a:r>
-              <a:rPr lang="en-AU" sz="1100" dirty="0" smtClean="0">
+              <a:rPr lang="en-AU" sz="1100" dirty="0">
                 <a:solidFill>
                   <a:schemeClr val="tx1"/>
                 </a:solidFill>
               </a:rPr>
               <a:t>Output Datasets</a:t>
             </a:r>
-            <a:endParaRPr lang="en-AU" sz="1100" dirty="0">
-              <a:solidFill>
-                <a:schemeClr val="tx1"/>
-              </a:solidFill>
-            </a:endParaRPr>
           </a:p>
         </p:txBody>
       </p:sp>
@@ -3556,18 +3530,13 @@
           <a:p>
             <a:pPr algn="ctr"/>
             <a:r>
-              <a:rPr lang="en-AU" sz="1200" i="1" dirty="0" smtClean="0">
+              <a:rPr lang="en-AU" sz="1200" i="1" dirty="0">
                 <a:solidFill>
                   <a:srgbClr val="C00000"/>
                 </a:solidFill>
               </a:rPr>
               <a:t>Data from APIs</a:t>
             </a:r>
-            <a:endParaRPr lang="en-AU" sz="1200" i="1" dirty="0">
-              <a:solidFill>
-                <a:srgbClr val="C00000"/>
-              </a:solidFill>
-            </a:endParaRPr>
           </a:p>
         </p:txBody>
       </p:sp>
@@ -3657,18 +3626,13 @@
           <a:p>
             <a:pPr algn="ctr"/>
             <a:r>
-              <a:rPr lang="en-AU" sz="1100" dirty="0" smtClean="0">
+              <a:rPr lang="en-AU" sz="1100" dirty="0">
                 <a:solidFill>
                   <a:schemeClr val="tx1"/>
                 </a:solidFill>
               </a:rPr>
               <a:t>Internal Datasets</a:t>
             </a:r>
-            <a:endParaRPr lang="en-AU" sz="1100" dirty="0">
-              <a:solidFill>
-                <a:schemeClr val="tx1"/>
-              </a:solidFill>
-            </a:endParaRPr>
           </a:p>
         </p:txBody>
       </p:sp>
@@ -3781,18 +3745,17 @@
           <a:lstStyle/>
           <a:p>
             <a:r>
-              <a:rPr lang="en-AU" u="sng" dirty="0" smtClean="0"/>
+              <a:rPr lang="en-AU" u="sng" dirty="0"/>
               <a:t>Species of </a:t>
             </a:r>
             <a:r>
-              <a:rPr lang="en-AU" u="sng" dirty="0" err="1" smtClean="0"/>
+              <a:rPr lang="en-AU" u="sng" dirty="0" err="1"/>
               <a:t>Digiscape</a:t>
             </a:r>
             <a:r>
-              <a:rPr lang="en-AU" u="sng" dirty="0" smtClean="0"/>
+              <a:rPr lang="en-AU" u="sng" dirty="0"/>
               <a:t> Datasets</a:t>
             </a:r>
-            <a:endParaRPr lang="en-AU" u="sng" dirty="0"/>
           </a:p>
         </p:txBody>
       </p:sp>
@@ -3843,18 +3806,13 @@
           <a:p>
             <a:pPr algn="ctr"/>
             <a:r>
-              <a:rPr lang="en-AU" sz="1000" dirty="0" smtClean="0">
+              <a:rPr lang="en-AU" sz="1000" dirty="0">
                 <a:solidFill>
                   <a:schemeClr val="tx1"/>
                 </a:solidFill>
               </a:rPr>
               <a:t>Reference Metadata Datasets</a:t>
             </a:r>
-            <a:endParaRPr lang="en-AU" sz="1000" dirty="0">
-              <a:solidFill>
-                <a:schemeClr val="tx1"/>
-              </a:solidFill>
-            </a:endParaRPr>
           </a:p>
         </p:txBody>
       </p:sp>
@@ -3991,18 +3949,13 @@
           <a:p>
             <a:pPr algn="ctr"/>
             <a:r>
-              <a:rPr lang="en-AU" sz="1100" dirty="0" smtClean="0">
+              <a:rPr lang="en-AU" sz="1100" dirty="0">
                 <a:solidFill>
                   <a:schemeClr val="tx1"/>
                 </a:solidFill>
               </a:rPr>
               <a:t>Software Code</a:t>
             </a:r>
-            <a:endParaRPr lang="en-AU" sz="1100" dirty="0">
-              <a:solidFill>
-                <a:schemeClr val="tx1"/>
-              </a:solidFill>
-            </a:endParaRPr>
           </a:p>
         </p:txBody>
       </p:sp>
@@ -4053,7 +4006,7 @@
           <a:p>
             <a:pPr algn="ctr"/>
             <a:r>
-              <a:rPr lang="en-AU" sz="1100" dirty="0" err="1" smtClean="0">
+              <a:rPr lang="en-AU" sz="1100" dirty="0" err="1">
                 <a:solidFill>
                   <a:schemeClr val="tx1"/>
                 </a:solidFill>
@@ -4061,18 +4014,13 @@
               <a:t>Config</a:t>
             </a:r>
             <a:r>
-              <a:rPr lang="en-AU" sz="1100" dirty="0" smtClean="0">
+              <a:rPr lang="en-AU" sz="1100" dirty="0">
                 <a:solidFill>
                   <a:schemeClr val="tx1"/>
                 </a:solidFill>
               </a:rPr>
               <a:t> Files</a:t>
             </a:r>
-            <a:endParaRPr lang="en-AU" sz="1100" dirty="0">
-              <a:solidFill>
-                <a:schemeClr val="tx1"/>
-              </a:solidFill>
-            </a:endParaRPr>
           </a:p>
         </p:txBody>
       </p:sp>
@@ -4086,13 +4034,6 @@
   <p:clrMapOvr>
     <a:masterClrMapping/>
   </p:clrMapOvr>
-  <p:timing>
-    <p:tnLst>
-      <p:par>
-        <p:cTn id="1" dur="indefinite" restart="never" nodeType="tmRoot"/>
-      </p:par>
-    </p:tnLst>
-  </p:timing>
 </p:sld>
 </file>
 
@@ -4129,10 +4070,9 @@
           <a:lstStyle/>
           <a:p>
             <a:r>
-              <a:rPr lang="en-AU" dirty="0" smtClean="0"/>
+              <a:rPr lang="en-AU" dirty="0"/>
               <a:t>Entity Notes</a:t>
             </a:r>
-            <a:endParaRPr lang="en-AU" dirty="0"/>
           </a:p>
         </p:txBody>
       </p:sp>
@@ -4152,21 +4092,21 @@
           <a:lstStyle/>
           <a:p>
             <a:r>
-              <a:rPr lang="en-AU" dirty="0" smtClean="0"/>
+              <a:rPr lang="en-AU" dirty="0"/>
               <a:t>Not all “Datasets” are chunks of files: they could be expressions of Web Service calls, i.e. web logs of requests against </a:t>
             </a:r>
             <a:r>
-              <a:rPr lang="en-AU" dirty="0" err="1" smtClean="0"/>
+              <a:rPr lang="en-AU" dirty="0" err="1"/>
               <a:t>Digiscape</a:t>
             </a:r>
             <a:r>
-              <a:rPr lang="en-AU" dirty="0" smtClean="0"/>
+              <a:rPr lang="en-AU" dirty="0"/>
               <a:t> APIs</a:t>
             </a:r>
           </a:p>
           <a:p>
             <a:r>
-              <a:rPr lang="en-AU" dirty="0" smtClean="0"/>
+              <a:rPr lang="en-AU" dirty="0"/>
               <a:t>There can be any level of specialisation within the Source, Output etc. Entity types presented here for particular purposes</a:t>
             </a:r>
           </a:p>
@@ -4182,13 +4122,6 @@
   <p:clrMapOvr>
     <a:masterClrMapping/>
   </p:clrMapOvr>
-  <p:timing>
-    <p:tnLst>
-      <p:par>
-        <p:cTn id="1" dur="indefinite" restart="never" nodeType="tmRoot"/>
-      </p:par>
-    </p:tnLst>
-  </p:timing>
 </p:sld>
 </file>
 
@@ -4262,10 +4195,9 @@
           <a:lstStyle/>
           <a:p>
             <a:r>
-              <a:rPr lang="en-AU" dirty="0" smtClean="0"/>
+              <a:rPr lang="en-AU" dirty="0"/>
               <a:t>Conflux architecture</a:t>
             </a:r>
-            <a:endParaRPr lang="en-AU" dirty="0"/>
           </a:p>
         </p:txBody>
       </p:sp>
@@ -4316,18 +4248,13 @@
           <a:p>
             <a:pPr algn="ctr"/>
             <a:r>
-              <a:rPr lang="en-AU" sz="1100" dirty="0" smtClean="0">
+              <a:rPr lang="en-AU" sz="1100" dirty="0">
                 <a:solidFill>
                   <a:schemeClr val="tx1"/>
                 </a:solidFill>
               </a:rPr>
               <a:t>Entity</a:t>
             </a:r>
-            <a:endParaRPr lang="en-AU" sz="1100" dirty="0">
-              <a:solidFill>
-                <a:schemeClr val="tx1"/>
-              </a:solidFill>
-            </a:endParaRPr>
           </a:p>
         </p:txBody>
       </p:sp>
@@ -4378,18 +4305,13 @@
           <a:p>
             <a:pPr algn="ctr"/>
             <a:r>
-              <a:rPr lang="en-AU" sz="1100" dirty="0" smtClean="0">
+              <a:rPr lang="en-AU" sz="1100" dirty="0">
                 <a:solidFill>
                   <a:schemeClr val="tx1"/>
                 </a:solidFill>
               </a:rPr>
               <a:t>Activity</a:t>
             </a:r>
-            <a:endParaRPr lang="en-AU" sz="1100" dirty="0">
-              <a:solidFill>
-                <a:schemeClr val="tx1"/>
-              </a:solidFill>
-            </a:endParaRPr>
           </a:p>
         </p:txBody>
       </p:sp>
@@ -4491,18 +4413,13 @@
           <a:p>
             <a:pPr algn="ctr"/>
             <a:r>
-              <a:rPr lang="en-AU" sz="1100" dirty="0" smtClean="0">
+              <a:rPr lang="en-AU" sz="1100" dirty="0">
                 <a:solidFill>
                   <a:schemeClr val="tx1"/>
                 </a:solidFill>
               </a:rPr>
               <a:t>Agent</a:t>
             </a:r>
-            <a:endParaRPr lang="en-AU" sz="1100" dirty="0">
-              <a:solidFill>
-                <a:schemeClr val="tx1"/>
-              </a:solidFill>
-            </a:endParaRPr>
           </a:p>
         </p:txBody>
       </p:sp>
@@ -4529,10 +4446,9 @@
           <a:lstStyle/>
           <a:p>
             <a:r>
-              <a:rPr lang="en-AU" sz="1400" u="sng" dirty="0" smtClean="0"/>
+              <a:rPr lang="en-AU" sz="1400" u="sng" dirty="0"/>
               <a:t>PROV-O Classes</a:t>
             </a:r>
-            <a:endParaRPr lang="en-AU" sz="1400" u="sng" dirty="0"/>
           </a:p>
         </p:txBody>
       </p:sp>
@@ -4817,18 +4733,17 @@
           <a:lstStyle/>
           <a:p>
             <a:r>
-              <a:rPr lang="en-AU" u="sng" dirty="0" smtClean="0"/>
+              <a:rPr lang="en-AU" u="sng" dirty="0"/>
               <a:t>Species of </a:t>
             </a:r>
             <a:r>
-              <a:rPr lang="en-AU" u="sng" dirty="0" err="1" smtClean="0"/>
+              <a:rPr lang="en-AU" u="sng" dirty="0" err="1"/>
               <a:t>Digiscape</a:t>
             </a:r>
             <a:r>
-              <a:rPr lang="en-AU" u="sng" dirty="0" smtClean="0"/>
+              <a:rPr lang="en-AU" u="sng" dirty="0"/>
               <a:t> Activities</a:t>
             </a:r>
-            <a:endParaRPr lang="en-AU" u="sng" dirty="0"/>
           </a:p>
         </p:txBody>
       </p:sp>
@@ -4879,18 +4794,13 @@
           <a:p>
             <a:pPr algn="ctr"/>
             <a:r>
-              <a:rPr lang="en-AU" sz="1100" dirty="0" smtClean="0">
+              <a:rPr lang="en-AU" sz="1100" dirty="0">
                 <a:solidFill>
                   <a:schemeClr val="tx1"/>
                 </a:solidFill>
               </a:rPr>
               <a:t>Source Dataset Preparation</a:t>
             </a:r>
-            <a:endParaRPr lang="en-AU" sz="1100" dirty="0">
-              <a:solidFill>
-                <a:schemeClr val="tx1"/>
-              </a:solidFill>
-            </a:endParaRPr>
           </a:p>
         </p:txBody>
       </p:sp>
@@ -4941,18 +4851,13 @@
           <a:p>
             <a:pPr algn="ctr"/>
             <a:r>
-              <a:rPr lang="en-AU" sz="1100" dirty="0" smtClean="0">
+              <a:rPr lang="en-AU" sz="1100" dirty="0">
                 <a:solidFill>
                   <a:schemeClr val="tx1"/>
                 </a:solidFill>
               </a:rPr>
               <a:t>Model Execution</a:t>
             </a:r>
-            <a:endParaRPr lang="en-AU" sz="1100" dirty="0">
-              <a:solidFill>
-                <a:schemeClr val="tx1"/>
-              </a:solidFill>
-            </a:endParaRPr>
           </a:p>
         </p:txBody>
       </p:sp>
@@ -5003,18 +4908,13 @@
           <a:p>
             <a:pPr algn="ctr"/>
             <a:r>
-              <a:rPr lang="en-AU" sz="1050" dirty="0" smtClean="0">
+              <a:rPr lang="en-AU" sz="1050" dirty="0">
                 <a:solidFill>
                   <a:schemeClr val="tx1"/>
                 </a:solidFill>
               </a:rPr>
               <a:t>API Transformations</a:t>
             </a:r>
-            <a:endParaRPr lang="en-AU" sz="1050" dirty="0">
-              <a:solidFill>
-                <a:schemeClr val="tx1"/>
-              </a:solidFill>
-            </a:endParaRPr>
           </a:p>
         </p:txBody>
       </p:sp>
@@ -5498,18 +5398,13 @@
           <a:p>
             <a:pPr algn="ctr"/>
             <a:r>
-              <a:rPr lang="en-AU" sz="1050" dirty="0" smtClean="0">
+              <a:rPr lang="en-AU" sz="1050" dirty="0">
                 <a:solidFill>
                   <a:schemeClr val="tx1"/>
                 </a:solidFill>
               </a:rPr>
               <a:t>Internal Dataset Processing</a:t>
             </a:r>
-            <a:endParaRPr lang="en-AU" sz="1050" dirty="0">
-              <a:solidFill>
-                <a:schemeClr val="tx1"/>
-              </a:solidFill>
-            </a:endParaRPr>
           </a:p>
         </p:txBody>
       </p:sp>
@@ -5609,13 +5504,6 @@
   <p:clrMapOvr>
     <a:masterClrMapping/>
   </p:clrMapOvr>
-  <p:timing>
-    <p:tnLst>
-      <p:par>
-        <p:cTn id="1" dur="indefinite" restart="never" nodeType="tmRoot"/>
-      </p:par>
-    </p:tnLst>
-  </p:timing>
 </p:sld>
 </file>
 
@@ -5652,10 +5540,9 @@
           <a:lstStyle/>
           <a:p>
             <a:r>
-              <a:rPr lang="en-AU" dirty="0" smtClean="0"/>
+              <a:rPr lang="en-AU" dirty="0"/>
               <a:t>Activity Notes</a:t>
             </a:r>
-            <a:endParaRPr lang="en-AU" dirty="0"/>
           </a:p>
         </p:txBody>
       </p:sp>
@@ -5675,29 +5562,29 @@
           <a:lstStyle/>
           <a:p>
             <a:r>
-              <a:rPr lang="en-AU" dirty="0" smtClean="0"/>
+              <a:rPr lang="en-AU" dirty="0"/>
               <a:t>Activities may not need to be typed as type may be unimportant or inferred</a:t>
             </a:r>
           </a:p>
           <a:p>
             <a:pPr lvl="1"/>
             <a:r>
-              <a:rPr lang="en-AU" dirty="0" smtClean="0"/>
+              <a:rPr lang="en-AU" dirty="0"/>
               <a:t>Inferring type: an instance of an Activity could be recorded and the Agent that enacted it, e.g. a “Run Model” Activity by Agent Model X</a:t>
             </a:r>
           </a:p>
           <a:p>
             <a:pPr lvl="1"/>
             <a:r>
-              <a:rPr lang="en-AU" dirty="0" smtClean="0"/>
+              <a:rPr lang="en-AU" dirty="0"/>
               <a:t>A </a:t>
             </a:r>
             <a:r>
-              <a:rPr lang="en-AU" dirty="0" err="1" smtClean="0"/>
+              <a:rPr lang="en-AU" dirty="0" err="1"/>
               <a:t>prov:Plan</a:t>
             </a:r>
             <a:r>
-              <a:rPr lang="en-AU" dirty="0" smtClean="0"/>
+              <a:rPr lang="en-AU" dirty="0"/>
               <a:t> object of a particular type, e.g. a particular Software Code, may be consumed by an un-typed Activity indicating what process was run</a:t>
             </a:r>
           </a:p>
@@ -5713,13 +5600,6 @@
   <p:clrMapOvr>
     <a:masterClrMapping/>
   </p:clrMapOvr>
-  <p:timing>
-    <p:tnLst>
-      <p:par>
-        <p:cTn id="1" dur="indefinite" restart="never" nodeType="tmRoot"/>
-      </p:par>
-    </p:tnLst>
-  </p:timing>
 </p:sld>
 </file>
 
@@ -5793,10 +5673,9 @@
           <a:lstStyle/>
           <a:p>
             <a:r>
-              <a:rPr lang="en-AU" dirty="0" smtClean="0"/>
+              <a:rPr lang="en-AU" dirty="0"/>
               <a:t>Conflux architecture</a:t>
             </a:r>
-            <a:endParaRPr lang="en-AU" dirty="0"/>
           </a:p>
         </p:txBody>
       </p:sp>
@@ -5847,18 +5726,13 @@
           <a:p>
             <a:pPr algn="ctr"/>
             <a:r>
-              <a:rPr lang="en-AU" sz="1100" dirty="0" smtClean="0">
+              <a:rPr lang="en-AU" sz="1100" dirty="0">
                 <a:solidFill>
                   <a:schemeClr val="tx1"/>
                 </a:solidFill>
               </a:rPr>
               <a:t>Entity</a:t>
             </a:r>
-            <a:endParaRPr lang="en-AU" sz="1100" dirty="0">
-              <a:solidFill>
-                <a:schemeClr val="tx1"/>
-              </a:solidFill>
-            </a:endParaRPr>
           </a:p>
         </p:txBody>
       </p:sp>
@@ -5909,18 +5783,13 @@
           <a:p>
             <a:pPr algn="ctr"/>
             <a:r>
-              <a:rPr lang="en-AU" sz="1100" dirty="0" smtClean="0">
+              <a:rPr lang="en-AU" sz="1100" dirty="0">
                 <a:solidFill>
                   <a:schemeClr val="tx1"/>
                 </a:solidFill>
               </a:rPr>
               <a:t>Activity</a:t>
             </a:r>
-            <a:endParaRPr lang="en-AU" sz="1100" dirty="0">
-              <a:solidFill>
-                <a:schemeClr val="tx1"/>
-              </a:solidFill>
-            </a:endParaRPr>
           </a:p>
         </p:txBody>
       </p:sp>
@@ -6022,18 +5891,13 @@
           <a:p>
             <a:pPr algn="ctr"/>
             <a:r>
-              <a:rPr lang="en-AU" sz="1100" dirty="0" smtClean="0">
+              <a:rPr lang="en-AU" sz="1100" dirty="0">
                 <a:solidFill>
                   <a:schemeClr val="tx1"/>
                 </a:solidFill>
               </a:rPr>
               <a:t>Agent</a:t>
             </a:r>
-            <a:endParaRPr lang="en-AU" sz="1100" dirty="0">
-              <a:solidFill>
-                <a:schemeClr val="tx1"/>
-              </a:solidFill>
-            </a:endParaRPr>
           </a:p>
         </p:txBody>
       </p:sp>
@@ -6060,10 +5924,9 @@
           <a:lstStyle/>
           <a:p>
             <a:r>
-              <a:rPr lang="en-AU" sz="1400" u="sng" dirty="0" smtClean="0"/>
+              <a:rPr lang="en-AU" sz="1400" u="sng" dirty="0"/>
               <a:t>PROV-O Classes</a:t>
             </a:r>
-            <a:endParaRPr lang="en-AU" sz="1400" u="sng" dirty="0"/>
           </a:p>
         </p:txBody>
       </p:sp>
@@ -6128,18 +5991,17 @@
           <a:lstStyle/>
           <a:p>
             <a:r>
-              <a:rPr lang="en-AU" u="sng" dirty="0" smtClean="0"/>
+              <a:rPr lang="en-AU" u="sng" dirty="0"/>
               <a:t>Species of </a:t>
             </a:r>
             <a:r>
-              <a:rPr lang="en-AU" u="sng" dirty="0" err="1" smtClean="0"/>
+              <a:rPr lang="en-AU" u="sng" dirty="0" err="1"/>
               <a:t>Digiscape</a:t>
             </a:r>
             <a:r>
-              <a:rPr lang="en-AU" u="sng" dirty="0" smtClean="0"/>
+              <a:rPr lang="en-AU" u="sng" dirty="0"/>
               <a:t> Agents</a:t>
             </a:r>
-            <a:endParaRPr lang="en-AU" u="sng" dirty="0"/>
           </a:p>
         </p:txBody>
       </p:sp>
@@ -6617,7 +6479,7 @@
           <a:p>
             <a:pPr algn="ctr"/>
             <a:r>
-              <a:rPr lang="en-AU" sz="1100" dirty="0" err="1" smtClean="0">
+              <a:rPr lang="en-AU" sz="1100" dirty="0" err="1">
                 <a:solidFill>
                   <a:schemeClr val="tx1"/>
                 </a:solidFill>
@@ -6625,18 +6487,13 @@
               <a:t>Digiscape</a:t>
             </a:r>
             <a:r>
-              <a:rPr lang="en-AU" sz="1100" dirty="0" smtClean="0">
+              <a:rPr lang="en-AU" sz="1100" dirty="0">
                 <a:solidFill>
                   <a:schemeClr val="tx1"/>
                 </a:solidFill>
               </a:rPr>
               <a:t> Systems</a:t>
             </a:r>
-            <a:endParaRPr lang="en-AU" sz="1100" dirty="0">
-              <a:solidFill>
-                <a:schemeClr val="tx1"/>
-              </a:solidFill>
-            </a:endParaRPr>
           </a:p>
         </p:txBody>
       </p:sp>
@@ -7002,7 +6859,7 @@
           <a:p>
             <a:pPr algn="ctr"/>
             <a:r>
-              <a:rPr lang="en-AU" sz="1100" dirty="0" err="1" smtClean="0">
+              <a:rPr lang="en-AU" sz="1100" dirty="0" err="1">
                 <a:solidFill>
                   <a:schemeClr val="tx1"/>
                 </a:solidFill>
@@ -7010,18 +6867,13 @@
               <a:t>Digiscape</a:t>
             </a:r>
             <a:r>
-              <a:rPr lang="en-AU" sz="1100" dirty="0" smtClean="0">
+              <a:rPr lang="en-AU" sz="1100" dirty="0">
                 <a:solidFill>
                   <a:schemeClr val="tx1"/>
                 </a:solidFill>
               </a:rPr>
               <a:t> People</a:t>
             </a:r>
-            <a:endParaRPr lang="en-AU" sz="1100" dirty="0">
-              <a:solidFill>
-                <a:schemeClr val="tx1"/>
-              </a:solidFill>
-            </a:endParaRPr>
           </a:p>
         </p:txBody>
       </p:sp>
@@ -7035,13 +6887,6 @@
   <p:clrMapOvr>
     <a:masterClrMapping/>
   </p:clrMapOvr>
-  <p:timing>
-    <p:tnLst>
-      <p:par>
-        <p:cTn id="1" dur="indefinite" restart="never" nodeType="tmRoot"/>
-      </p:par>
-    </p:tnLst>
-  </p:timing>
 </p:sld>
 </file>
 
@@ -7078,10 +6923,9 @@
           <a:lstStyle/>
           <a:p>
             <a:r>
-              <a:rPr lang="en-AU" dirty="0" smtClean="0"/>
+              <a:rPr lang="en-AU" dirty="0"/>
               <a:t>Agent Notes</a:t>
             </a:r>
-            <a:endParaRPr lang="en-AU" dirty="0"/>
           </a:p>
         </p:txBody>
       </p:sp>
@@ -7101,29 +6945,29 @@
           <a:lstStyle/>
           <a:p>
             <a:r>
-              <a:rPr lang="en-AU" dirty="0" smtClean="0"/>
+              <a:rPr lang="en-AU" dirty="0"/>
               <a:t>All </a:t>
             </a:r>
             <a:r>
-              <a:rPr lang="en-AU" dirty="0" err="1" smtClean="0"/>
+              <a:rPr lang="en-AU" dirty="0" err="1"/>
               <a:t>Digiscape</a:t>
             </a:r>
             <a:r>
-              <a:rPr lang="en-AU" dirty="0" smtClean="0"/>
+              <a:rPr lang="en-AU" dirty="0"/>
               <a:t> systems and people are interpreted as Agents</a:t>
             </a:r>
           </a:p>
           <a:p>
             <a:r>
-              <a:rPr lang="en-AU" dirty="0" smtClean="0"/>
+              <a:rPr lang="en-AU" dirty="0"/>
               <a:t>Specialised Agents, </a:t>
             </a:r>
             <a:r>
-              <a:rPr lang="en-AU" dirty="0" err="1" smtClean="0"/>
+              <a:rPr lang="en-AU" dirty="0" err="1"/>
               <a:t>ReportingSystems</a:t>
             </a:r>
             <a:r>
-              <a:rPr lang="en-AU" dirty="0" smtClean="0"/>
+              <a:rPr lang="en-AU" dirty="0"/>
               <a:t>, can report provenance to PROMS</a:t>
             </a:r>
           </a:p>
@@ -7139,13 +6983,6 @@
   <p:clrMapOvr>
     <a:masterClrMapping/>
   </p:clrMapOvr>
-  <p:timing>
-    <p:tnLst>
-      <p:par>
-        <p:cTn id="1" dur="indefinite" restart="never" nodeType="tmRoot"/>
-      </p:par>
-    </p:tnLst>
-  </p:timing>
 </p:sld>
 </file>
 
@@ -7182,14 +7019,13 @@
           <a:lstStyle/>
           <a:p>
             <a:r>
-              <a:rPr lang="en-AU" dirty="0" err="1" smtClean="0"/>
+              <a:rPr lang="en-AU" dirty="0" err="1"/>
               <a:t>Digiscape</a:t>
             </a:r>
             <a:r>
-              <a:rPr lang="en-AU" dirty="0" smtClean="0"/>
+              <a:rPr lang="en-AU" dirty="0"/>
               <a:t> prov. model use by PROMS</a:t>
             </a:r>
-            <a:endParaRPr lang="en-AU" dirty="0"/>
           </a:p>
         </p:txBody>
       </p:sp>
@@ -7209,86 +7045,85 @@
           <a:lstStyle/>
           <a:p>
             <a:r>
-              <a:rPr lang="en-AU" dirty="0" smtClean="0"/>
+              <a:rPr lang="en-AU" dirty="0"/>
               <a:t>This </a:t>
             </a:r>
             <a:r>
-              <a:rPr lang="en-AU" dirty="0" err="1" smtClean="0"/>
+              <a:rPr lang="en-AU" dirty="0" err="1"/>
               <a:t>Digiscape</a:t>
             </a:r>
             <a:r>
-              <a:rPr lang="en-AU" dirty="0" smtClean="0"/>
+              <a:rPr lang="en-AU" dirty="0"/>
               <a:t> provenance model can be implemented as an Ontology </a:t>
             </a:r>
           </a:p>
           <a:p>
             <a:r>
-              <a:rPr lang="en-AU" dirty="0" smtClean="0"/>
+              <a:rPr lang="en-AU" dirty="0"/>
               <a:t>PROMS implements hierarchical validation for all Reports of provenance sent to it, therefore all Reports must be:</a:t>
             </a:r>
           </a:p>
           <a:p>
             <a:pPr lvl="1"/>
             <a:r>
-              <a:rPr lang="en-AU" dirty="0" smtClean="0"/>
+              <a:rPr lang="en-AU" dirty="0"/>
               <a:t>PROV-O valid</a:t>
             </a:r>
           </a:p>
           <a:p>
             <a:pPr lvl="1"/>
             <a:r>
-              <a:rPr lang="en-AU" dirty="0" smtClean="0"/>
+              <a:rPr lang="en-AU" dirty="0"/>
               <a:t>PROMS-O valid (e.g. the sender of a Report is a </a:t>
             </a:r>
             <a:r>
-              <a:rPr lang="en-AU" dirty="0" err="1" smtClean="0"/>
+              <a:rPr lang="en-AU" dirty="0" err="1"/>
               <a:t>Reportingsystem</a:t>
             </a:r>
             <a:r>
-              <a:rPr lang="en-AU" dirty="0" smtClean="0"/>
+              <a:rPr lang="en-AU" dirty="0"/>
               <a:t>)</a:t>
             </a:r>
           </a:p>
           <a:p>
             <a:r>
-              <a:rPr lang="en-AU" dirty="0" err="1" smtClean="0"/>
+              <a:rPr lang="en-AU" dirty="0" err="1"/>
               <a:t>Digiscape</a:t>
             </a:r>
             <a:r>
-              <a:rPr lang="en-AU" dirty="0" smtClean="0"/>
+              <a:rPr lang="en-AU" dirty="0"/>
               <a:t> could implement a provenance model that then can be used for validation of </a:t>
             </a:r>
             <a:r>
-              <a:rPr lang="en-AU" dirty="0" err="1" smtClean="0"/>
+              <a:rPr lang="en-AU" dirty="0" err="1"/>
               <a:t>Digiscape</a:t>
             </a:r>
             <a:r>
-              <a:rPr lang="en-AU" dirty="0" smtClean="0"/>
+              <a:rPr lang="en-AU" dirty="0"/>
               <a:t> Reports so PROMS would implement “</a:t>
             </a:r>
             <a:r>
-              <a:rPr lang="en-AU" dirty="0" err="1" smtClean="0"/>
+              <a:rPr lang="en-AU" dirty="0" err="1"/>
               <a:t>Digiscape</a:t>
             </a:r>
             <a:r>
-              <a:rPr lang="en-AU" dirty="0" smtClean="0"/>
+              <a:rPr lang="en-AU" dirty="0"/>
               <a:t>-O valid” after PROV-O &amp; PROMS-O valid tests</a:t>
             </a:r>
           </a:p>
           <a:p>
             <a:r>
-              <a:rPr lang="en-AU" dirty="0" smtClean="0"/>
+              <a:rPr lang="en-AU" dirty="0"/>
               <a:t>Further specialised validators can be used, e.g. for </a:t>
             </a:r>
             <a:r>
-              <a:rPr lang="en-AU" dirty="0" err="1" smtClean="0"/>
+              <a:rPr lang="en-AU" dirty="0" err="1"/>
               <a:t>Digiscape</a:t>
             </a:r>
             <a:r>
-              <a:rPr lang="en-AU" dirty="0" smtClean="0"/>
+              <a:rPr lang="en-AU" dirty="0"/>
               <a:t> Carbon Farming Reports</a:t>
             </a:r>
-            <a:endParaRPr lang="en-AU" dirty="0"/>
           </a:p>
         </p:txBody>
       </p:sp>
@@ -7302,13 +7137,1177 @@
   <p:clrMapOvr>
     <a:masterClrMapping/>
   </p:clrMapOvr>
-  <p:timing>
-    <p:tnLst>
-      <p:par>
-        <p:cTn id="1" dur="indefinite" restart="never" nodeType="tmRoot"/>
-      </p:par>
-    </p:tnLst>
-  </p:timing>
+</p:sld>
+</file>
+
+<file path=ppt/slides/slide8.xml><?xml version="1.0" encoding="utf-8"?>
+<p:sld xmlns:a="http://schemas.openxmlformats.org/drawingml/2006/main" xmlns:r="http://schemas.openxmlformats.org/officeDocument/2006/relationships" xmlns:p="http://schemas.openxmlformats.org/presentationml/2006/main">
+  <p:cSld>
+    <p:spTree>
+      <p:nvGrpSpPr>
+        <p:cNvPr id="1" name=""/>
+        <p:cNvGrpSpPr/>
+        <p:nvPr/>
+      </p:nvGrpSpPr>
+      <p:grpSpPr>
+        <a:xfrm>
+          <a:off x="0" y="0"/>
+          <a:ext cx="0" cy="0"/>
+          <a:chOff x="0" y="0"/>
+          <a:chExt cx="0" cy="0"/>
+        </a:xfrm>
+      </p:grpSpPr>
+      <p:sp>
+        <p:nvSpPr>
+          <p:cNvPr id="4" name="Oval 3">
+            <a:extLst>
+              <a:ext uri="{FF2B5EF4-FFF2-40B4-BE49-F238E27FC236}">
+                <a16:creationId xmlns:a16="http://schemas.microsoft.com/office/drawing/2014/main" id="{04154335-F208-4B4E-9BB0-32280BF9AA39}"/>
+              </a:ext>
+            </a:extLst>
+          </p:cNvPr>
+          <p:cNvSpPr/>
+          <p:nvPr/>
+        </p:nvSpPr>
+        <p:spPr>
+          <a:xfrm>
+            <a:off x="10612657" y="690154"/>
+            <a:ext cx="1090862" cy="420914"/>
+          </a:xfrm>
+          <a:prstGeom prst="ellipse">
+            <a:avLst/>
+          </a:prstGeom>
+          <a:solidFill>
+            <a:srgbClr val="FFFFD6"/>
+          </a:solidFill>
+          <a:ln>
+            <a:solidFill>
+              <a:schemeClr val="bg1">
+                <a:lumMod val="65000"/>
+              </a:schemeClr>
+            </a:solidFill>
+          </a:ln>
+        </p:spPr>
+        <p:style>
+          <a:lnRef idx="2">
+            <a:schemeClr val="accent1">
+              <a:shade val="50000"/>
+            </a:schemeClr>
+          </a:lnRef>
+          <a:fillRef idx="1">
+            <a:schemeClr val="accent1"/>
+          </a:fillRef>
+          <a:effectRef idx="0">
+            <a:schemeClr val="accent1"/>
+          </a:effectRef>
+          <a:fontRef idx="minor">
+            <a:schemeClr val="lt1"/>
+          </a:fontRef>
+        </p:style>
+        <p:txBody>
+          <a:bodyPr rtlCol="0" anchor="ctr"/>
+          <a:lstStyle/>
+          <a:p>
+            <a:pPr algn="ctr"/>
+            <a:r>
+              <a:rPr lang="en-AU" sz="1100" dirty="0">
+                <a:solidFill>
+                  <a:schemeClr val="tx1"/>
+                </a:solidFill>
+              </a:rPr>
+              <a:t>Entity</a:t>
+            </a:r>
+          </a:p>
+        </p:txBody>
+      </p:sp>
+      <p:sp>
+        <p:nvSpPr>
+          <p:cNvPr id="5" name="Rectangle 4">
+            <a:extLst>
+              <a:ext uri="{FF2B5EF4-FFF2-40B4-BE49-F238E27FC236}">
+                <a16:creationId xmlns:a16="http://schemas.microsoft.com/office/drawing/2014/main" id="{CBCA8B88-170F-454C-B6B2-BAC08A18B2B1}"/>
+              </a:ext>
+            </a:extLst>
+          </p:cNvPr>
+          <p:cNvSpPr/>
+          <p:nvPr/>
+        </p:nvSpPr>
+        <p:spPr>
+          <a:xfrm>
+            <a:off x="10607691" y="1329434"/>
+            <a:ext cx="1090862" cy="420914"/>
+          </a:xfrm>
+          <a:prstGeom prst="rect">
+            <a:avLst/>
+          </a:prstGeom>
+          <a:solidFill>
+            <a:srgbClr val="C4BFFF"/>
+          </a:solidFill>
+          <a:ln>
+            <a:solidFill>
+              <a:schemeClr val="bg1">
+                <a:lumMod val="65000"/>
+              </a:schemeClr>
+            </a:solidFill>
+          </a:ln>
+        </p:spPr>
+        <p:style>
+          <a:lnRef idx="2">
+            <a:schemeClr val="accent1">
+              <a:shade val="50000"/>
+            </a:schemeClr>
+          </a:lnRef>
+          <a:fillRef idx="1">
+            <a:schemeClr val="accent1"/>
+          </a:fillRef>
+          <a:effectRef idx="0">
+            <a:schemeClr val="accent1"/>
+          </a:effectRef>
+          <a:fontRef idx="minor">
+            <a:schemeClr val="lt1"/>
+          </a:fontRef>
+        </p:style>
+        <p:txBody>
+          <a:bodyPr rtlCol="0" anchor="ctr"/>
+          <a:lstStyle/>
+          <a:p>
+            <a:pPr algn="ctr"/>
+            <a:r>
+              <a:rPr lang="en-AU" sz="1100" dirty="0">
+                <a:solidFill>
+                  <a:schemeClr val="tx1"/>
+                </a:solidFill>
+              </a:rPr>
+              <a:t>Activity</a:t>
+            </a:r>
+          </a:p>
+        </p:txBody>
+      </p:sp>
+      <p:sp>
+        <p:nvSpPr>
+          <p:cNvPr id="6" name="Freeform 5">
+            <a:extLst>
+              <a:ext uri="{FF2B5EF4-FFF2-40B4-BE49-F238E27FC236}">
+                <a16:creationId xmlns:a16="http://schemas.microsoft.com/office/drawing/2014/main" id="{F1A1FE5F-C61F-2446-9D9E-DFABA18AD753}"/>
+              </a:ext>
+            </a:extLst>
+          </p:cNvPr>
+          <p:cNvSpPr/>
+          <p:nvPr/>
+        </p:nvSpPr>
+        <p:spPr>
+          <a:xfrm>
+            <a:off x="10607691" y="1968714"/>
+            <a:ext cx="1095828" cy="689429"/>
+          </a:xfrm>
+          <a:custGeom>
+            <a:avLst/>
+            <a:gdLst>
+              <a:gd name="connsiteX0" fmla="*/ 547914 w 1095828"/>
+              <a:gd name="connsiteY0" fmla="*/ 0 h 689429"/>
+              <a:gd name="connsiteX1" fmla="*/ 1095828 w 1095828"/>
+              <a:gd name="connsiteY1" fmla="*/ 268515 h 689429"/>
+              <a:gd name="connsiteX2" fmla="*/ 1095828 w 1095828"/>
+              <a:gd name="connsiteY2" fmla="*/ 689429 h 689429"/>
+              <a:gd name="connsiteX3" fmla="*/ 0 w 1095828"/>
+              <a:gd name="connsiteY3" fmla="*/ 689429 h 689429"/>
+              <a:gd name="connsiteX4" fmla="*/ 0 w 1095828"/>
+              <a:gd name="connsiteY4" fmla="*/ 268515 h 689429"/>
+            </a:gdLst>
+            <a:ahLst/>
+            <a:cxnLst>
+              <a:cxn ang="0">
+                <a:pos x="connsiteX0" y="connsiteY0"/>
+              </a:cxn>
+              <a:cxn ang="0">
+                <a:pos x="connsiteX1" y="connsiteY1"/>
+              </a:cxn>
+              <a:cxn ang="0">
+                <a:pos x="connsiteX2" y="connsiteY2"/>
+              </a:cxn>
+              <a:cxn ang="0">
+                <a:pos x="connsiteX3" y="connsiteY3"/>
+              </a:cxn>
+              <a:cxn ang="0">
+                <a:pos x="connsiteX4" y="connsiteY4"/>
+              </a:cxn>
+            </a:cxnLst>
+            <a:rect l="l" t="t" r="r" b="b"/>
+            <a:pathLst>
+              <a:path w="1095828" h="689429">
+                <a:moveTo>
+                  <a:pt x="547914" y="0"/>
+                </a:moveTo>
+                <a:lnTo>
+                  <a:pt x="1095828" y="268515"/>
+                </a:lnTo>
+                <a:lnTo>
+                  <a:pt x="1095828" y="689429"/>
+                </a:lnTo>
+                <a:lnTo>
+                  <a:pt x="0" y="689429"/>
+                </a:lnTo>
+                <a:lnTo>
+                  <a:pt x="0" y="268515"/>
+                </a:lnTo>
+                <a:close/>
+              </a:path>
+            </a:pathLst>
+          </a:custGeom>
+          <a:solidFill>
+            <a:srgbClr val="FFD26D"/>
+          </a:solidFill>
+          <a:ln>
+            <a:solidFill>
+              <a:schemeClr val="bg1">
+                <a:lumMod val="65000"/>
+              </a:schemeClr>
+            </a:solidFill>
+          </a:ln>
+        </p:spPr>
+        <p:style>
+          <a:lnRef idx="2">
+            <a:schemeClr val="accent1">
+              <a:shade val="50000"/>
+            </a:schemeClr>
+          </a:lnRef>
+          <a:fillRef idx="1">
+            <a:schemeClr val="accent1"/>
+          </a:fillRef>
+          <a:effectRef idx="0">
+            <a:schemeClr val="accent1"/>
+          </a:effectRef>
+          <a:fontRef idx="minor">
+            <a:schemeClr val="lt1"/>
+          </a:fontRef>
+        </p:style>
+        <p:txBody>
+          <a:bodyPr rtlCol="0" anchor="ctr"/>
+          <a:lstStyle/>
+          <a:p>
+            <a:pPr algn="ctr"/>
+            <a:r>
+              <a:rPr lang="en-AU" sz="1100" dirty="0">
+                <a:solidFill>
+                  <a:schemeClr val="tx1"/>
+                </a:solidFill>
+              </a:rPr>
+              <a:t>Agent</a:t>
+            </a:r>
+          </a:p>
+        </p:txBody>
+      </p:sp>
+      <p:sp>
+        <p:nvSpPr>
+          <p:cNvPr id="7" name="TextBox 6">
+            <a:extLst>
+              <a:ext uri="{FF2B5EF4-FFF2-40B4-BE49-F238E27FC236}">
+                <a16:creationId xmlns:a16="http://schemas.microsoft.com/office/drawing/2014/main" id="{100DC6BE-322E-9B48-9399-BBAF40C58027}"/>
+              </a:ext>
+            </a:extLst>
+          </p:cNvPr>
+          <p:cNvSpPr txBox="1"/>
+          <p:nvPr/>
+        </p:nvSpPr>
+        <p:spPr>
+          <a:xfrm>
+            <a:off x="10487266" y="164011"/>
+            <a:ext cx="1331711" cy="307777"/>
+          </a:xfrm>
+          <a:prstGeom prst="rect">
+            <a:avLst/>
+          </a:prstGeom>
+          <a:noFill/>
+        </p:spPr>
+        <p:txBody>
+          <a:bodyPr wrap="none" rtlCol="0">
+            <a:spAutoFit/>
+          </a:bodyPr>
+          <a:lstStyle/>
+          <a:p>
+            <a:r>
+              <a:rPr lang="en-AU" sz="1400" u="sng" dirty="0"/>
+              <a:t>PROV-O Classes</a:t>
+            </a:r>
+          </a:p>
+        </p:txBody>
+      </p:sp>
+      <p:sp>
+        <p:nvSpPr>
+          <p:cNvPr id="8" name="Oval 7">
+            <a:extLst>
+              <a:ext uri="{FF2B5EF4-FFF2-40B4-BE49-F238E27FC236}">
+                <a16:creationId xmlns:a16="http://schemas.microsoft.com/office/drawing/2014/main" id="{88402915-5DE1-A54E-8992-3A9C87AD4779}"/>
+              </a:ext>
+            </a:extLst>
+          </p:cNvPr>
+          <p:cNvSpPr/>
+          <p:nvPr/>
+        </p:nvSpPr>
+        <p:spPr>
+          <a:xfrm>
+            <a:off x="2199791" y="3157491"/>
+            <a:ext cx="1090862" cy="420914"/>
+          </a:xfrm>
+          <a:prstGeom prst="ellipse">
+            <a:avLst/>
+          </a:prstGeom>
+          <a:solidFill>
+            <a:srgbClr val="FFFFD6"/>
+          </a:solidFill>
+          <a:ln>
+            <a:solidFill>
+              <a:schemeClr val="bg1">
+                <a:lumMod val="65000"/>
+              </a:schemeClr>
+            </a:solidFill>
+          </a:ln>
+        </p:spPr>
+        <p:style>
+          <a:lnRef idx="2">
+            <a:schemeClr val="accent1">
+              <a:shade val="50000"/>
+            </a:schemeClr>
+          </a:lnRef>
+          <a:fillRef idx="1">
+            <a:schemeClr val="accent1"/>
+          </a:fillRef>
+          <a:effectRef idx="0">
+            <a:schemeClr val="accent1"/>
+          </a:effectRef>
+          <a:fontRef idx="minor">
+            <a:schemeClr val="lt1"/>
+          </a:fontRef>
+        </p:style>
+        <p:txBody>
+          <a:bodyPr rtlCol="0" anchor="ctr"/>
+          <a:lstStyle/>
+          <a:p>
+            <a:pPr algn="ctr"/>
+            <a:r>
+              <a:rPr lang="en-AU" sz="1100" dirty="0">
+                <a:solidFill>
+                  <a:schemeClr val="tx1"/>
+                </a:solidFill>
+              </a:rPr>
+              <a:t>Source Dataset</a:t>
+            </a:r>
+          </a:p>
+        </p:txBody>
+      </p:sp>
+      <p:sp>
+        <p:nvSpPr>
+          <p:cNvPr id="9" name="Oval 8">
+            <a:extLst>
+              <a:ext uri="{FF2B5EF4-FFF2-40B4-BE49-F238E27FC236}">
+                <a16:creationId xmlns:a16="http://schemas.microsoft.com/office/drawing/2014/main" id="{F0BA45C6-986C-BB43-82D5-2CC5450000AD}"/>
+              </a:ext>
+            </a:extLst>
+          </p:cNvPr>
+          <p:cNvSpPr/>
+          <p:nvPr/>
+        </p:nvSpPr>
+        <p:spPr>
+          <a:xfrm>
+            <a:off x="3692925" y="3157491"/>
+            <a:ext cx="1090862" cy="420914"/>
+          </a:xfrm>
+          <a:prstGeom prst="ellipse">
+            <a:avLst/>
+          </a:prstGeom>
+          <a:solidFill>
+            <a:srgbClr val="FFFFD6"/>
+          </a:solidFill>
+          <a:ln>
+            <a:solidFill>
+              <a:schemeClr val="bg1">
+                <a:lumMod val="65000"/>
+              </a:schemeClr>
+            </a:solidFill>
+          </a:ln>
+        </p:spPr>
+        <p:style>
+          <a:lnRef idx="2">
+            <a:schemeClr val="accent1">
+              <a:shade val="50000"/>
+            </a:schemeClr>
+          </a:lnRef>
+          <a:fillRef idx="1">
+            <a:schemeClr val="accent1"/>
+          </a:fillRef>
+          <a:effectRef idx="0">
+            <a:schemeClr val="accent1"/>
+          </a:effectRef>
+          <a:fontRef idx="minor">
+            <a:schemeClr val="lt1"/>
+          </a:fontRef>
+        </p:style>
+        <p:txBody>
+          <a:bodyPr rtlCol="0" anchor="ctr"/>
+          <a:lstStyle/>
+          <a:p>
+            <a:pPr algn="ctr"/>
+            <a:r>
+              <a:rPr lang="en-AU" sz="1100" dirty="0">
+                <a:solidFill>
+                  <a:schemeClr val="tx1"/>
+                </a:solidFill>
+              </a:rPr>
+              <a:t>Internal Dataset</a:t>
+            </a:r>
+          </a:p>
+        </p:txBody>
+      </p:sp>
+      <p:sp>
+        <p:nvSpPr>
+          <p:cNvPr id="10" name="Oval 9">
+            <a:extLst>
+              <a:ext uri="{FF2B5EF4-FFF2-40B4-BE49-F238E27FC236}">
+                <a16:creationId xmlns:a16="http://schemas.microsoft.com/office/drawing/2014/main" id="{FA2AF303-0E72-7646-9F05-ED649CAE43A1}"/>
+              </a:ext>
+            </a:extLst>
+          </p:cNvPr>
+          <p:cNvSpPr/>
+          <p:nvPr/>
+        </p:nvSpPr>
+        <p:spPr>
+          <a:xfrm>
+            <a:off x="5186059" y="3157491"/>
+            <a:ext cx="1090862" cy="420914"/>
+          </a:xfrm>
+          <a:prstGeom prst="ellipse">
+            <a:avLst/>
+          </a:prstGeom>
+          <a:solidFill>
+            <a:srgbClr val="FFFFD6"/>
+          </a:solidFill>
+          <a:ln>
+            <a:solidFill>
+              <a:schemeClr val="bg1">
+                <a:lumMod val="65000"/>
+              </a:schemeClr>
+            </a:solidFill>
+          </a:ln>
+        </p:spPr>
+        <p:style>
+          <a:lnRef idx="2">
+            <a:schemeClr val="accent1">
+              <a:shade val="50000"/>
+            </a:schemeClr>
+          </a:lnRef>
+          <a:fillRef idx="1">
+            <a:schemeClr val="accent1"/>
+          </a:fillRef>
+          <a:effectRef idx="0">
+            <a:schemeClr val="accent1"/>
+          </a:effectRef>
+          <a:fontRef idx="minor">
+            <a:schemeClr val="lt1"/>
+          </a:fontRef>
+        </p:style>
+        <p:txBody>
+          <a:bodyPr rtlCol="0" anchor="ctr"/>
+          <a:lstStyle/>
+          <a:p>
+            <a:pPr algn="ctr"/>
+            <a:r>
+              <a:rPr lang="en-AU" sz="1100" dirty="0">
+                <a:solidFill>
+                  <a:schemeClr val="tx1"/>
+                </a:solidFill>
+              </a:rPr>
+              <a:t>DigiScape Product</a:t>
+            </a:r>
+          </a:p>
+        </p:txBody>
+      </p:sp>
+      <p:sp>
+        <p:nvSpPr>
+          <p:cNvPr id="11" name="Oval 10">
+            <a:extLst>
+              <a:ext uri="{FF2B5EF4-FFF2-40B4-BE49-F238E27FC236}">
+                <a16:creationId xmlns:a16="http://schemas.microsoft.com/office/drawing/2014/main" id="{2ED54A67-D5C3-A643-85E6-7D89B28AC795}"/>
+              </a:ext>
+            </a:extLst>
+          </p:cNvPr>
+          <p:cNvSpPr/>
+          <p:nvPr/>
+        </p:nvSpPr>
+        <p:spPr>
+          <a:xfrm>
+            <a:off x="3692925" y="1013625"/>
+            <a:ext cx="1090862" cy="420914"/>
+          </a:xfrm>
+          <a:prstGeom prst="ellipse">
+            <a:avLst/>
+          </a:prstGeom>
+          <a:solidFill>
+            <a:schemeClr val="accent6">
+              <a:lumMod val="60000"/>
+              <a:lumOff val="40000"/>
+            </a:schemeClr>
+          </a:solidFill>
+          <a:ln>
+            <a:solidFill>
+              <a:schemeClr val="bg1">
+                <a:lumMod val="65000"/>
+              </a:schemeClr>
+            </a:solidFill>
+          </a:ln>
+        </p:spPr>
+        <p:style>
+          <a:lnRef idx="2">
+            <a:schemeClr val="accent1">
+              <a:shade val="50000"/>
+            </a:schemeClr>
+          </a:lnRef>
+          <a:fillRef idx="1">
+            <a:schemeClr val="accent1"/>
+          </a:fillRef>
+          <a:effectRef idx="0">
+            <a:schemeClr val="accent1"/>
+          </a:effectRef>
+          <a:fontRef idx="minor">
+            <a:schemeClr val="lt1"/>
+          </a:fontRef>
+        </p:style>
+        <p:txBody>
+          <a:bodyPr rtlCol="0" anchor="ctr"/>
+          <a:lstStyle/>
+          <a:p>
+            <a:pPr algn="ctr"/>
+            <a:r>
+              <a:rPr lang="en-AU" sz="1100" dirty="0">
+                <a:solidFill>
+                  <a:schemeClr val="tx1"/>
+                </a:solidFill>
+              </a:rPr>
+              <a:t>dcat: Dataset</a:t>
+            </a:r>
+          </a:p>
+        </p:txBody>
+      </p:sp>
+      <p:cxnSp>
+        <p:nvCxnSpPr>
+          <p:cNvPr id="13" name="Straight Arrow Connector 12">
+            <a:extLst>
+              <a:ext uri="{FF2B5EF4-FFF2-40B4-BE49-F238E27FC236}">
+                <a16:creationId xmlns:a16="http://schemas.microsoft.com/office/drawing/2014/main" id="{7DA4FD08-38D8-DD40-B573-4A000A55597F}"/>
+              </a:ext>
+            </a:extLst>
+          </p:cNvPr>
+          <p:cNvCxnSpPr>
+            <a:cxnSpLocks/>
+            <a:stCxn id="8" idx="0"/>
+            <a:endCxn id="23" idx="4"/>
+          </p:cNvCxnSpPr>
+          <p:nvPr/>
+        </p:nvCxnSpPr>
+        <p:spPr>
+          <a:xfrm flipV="1">
+            <a:off x="2745222" y="2523885"/>
+            <a:ext cx="1494335" cy="633606"/>
+          </a:xfrm>
+          <a:prstGeom prst="straightConnector1">
+            <a:avLst/>
+          </a:prstGeom>
+          <a:ln>
+            <a:solidFill>
+              <a:schemeClr val="tx1"/>
+            </a:solidFill>
+            <a:prstDash val="dash"/>
+            <a:headEnd type="none" w="med" len="med"/>
+            <a:tailEnd type="arrow" w="med" len="med"/>
+          </a:ln>
+        </p:spPr>
+        <p:style>
+          <a:lnRef idx="1">
+            <a:schemeClr val="accent1"/>
+          </a:lnRef>
+          <a:fillRef idx="0">
+            <a:schemeClr val="accent1"/>
+          </a:fillRef>
+          <a:effectRef idx="0">
+            <a:schemeClr val="accent1"/>
+          </a:effectRef>
+          <a:fontRef idx="minor">
+            <a:schemeClr val="tx1"/>
+          </a:fontRef>
+        </p:style>
+      </p:cxnSp>
+      <p:cxnSp>
+        <p:nvCxnSpPr>
+          <p:cNvPr id="14" name="Straight Arrow Connector 13">
+            <a:extLst>
+              <a:ext uri="{FF2B5EF4-FFF2-40B4-BE49-F238E27FC236}">
+                <a16:creationId xmlns:a16="http://schemas.microsoft.com/office/drawing/2014/main" id="{EEB34EE2-681B-D648-ADC9-933C6D93E8C6}"/>
+              </a:ext>
+            </a:extLst>
+          </p:cNvPr>
+          <p:cNvCxnSpPr>
+            <a:cxnSpLocks/>
+            <a:stCxn id="9" idx="0"/>
+            <a:endCxn id="23" idx="4"/>
+          </p:cNvCxnSpPr>
+          <p:nvPr/>
+        </p:nvCxnSpPr>
+        <p:spPr>
+          <a:xfrm flipV="1">
+            <a:off x="4238356" y="2523885"/>
+            <a:ext cx="1201" cy="633606"/>
+          </a:xfrm>
+          <a:prstGeom prst="straightConnector1">
+            <a:avLst/>
+          </a:prstGeom>
+          <a:ln>
+            <a:solidFill>
+              <a:schemeClr val="tx1"/>
+            </a:solidFill>
+            <a:prstDash val="dash"/>
+            <a:headEnd type="none" w="med" len="med"/>
+            <a:tailEnd type="arrow" w="med" len="med"/>
+          </a:ln>
+        </p:spPr>
+        <p:style>
+          <a:lnRef idx="1">
+            <a:schemeClr val="accent1"/>
+          </a:lnRef>
+          <a:fillRef idx="0">
+            <a:schemeClr val="accent1"/>
+          </a:fillRef>
+          <a:effectRef idx="0">
+            <a:schemeClr val="accent1"/>
+          </a:effectRef>
+          <a:fontRef idx="minor">
+            <a:schemeClr val="tx1"/>
+          </a:fontRef>
+        </p:style>
+      </p:cxnSp>
+      <p:cxnSp>
+        <p:nvCxnSpPr>
+          <p:cNvPr id="17" name="Straight Arrow Connector 16">
+            <a:extLst>
+              <a:ext uri="{FF2B5EF4-FFF2-40B4-BE49-F238E27FC236}">
+                <a16:creationId xmlns:a16="http://schemas.microsoft.com/office/drawing/2014/main" id="{902EA6FE-43EB-194F-8BBE-20BAA73C31DD}"/>
+              </a:ext>
+            </a:extLst>
+          </p:cNvPr>
+          <p:cNvCxnSpPr>
+            <a:cxnSpLocks/>
+            <a:stCxn id="10" idx="0"/>
+            <a:endCxn id="23" idx="4"/>
+          </p:cNvCxnSpPr>
+          <p:nvPr/>
+        </p:nvCxnSpPr>
+        <p:spPr>
+          <a:xfrm flipH="1" flipV="1">
+            <a:off x="4239557" y="2523885"/>
+            <a:ext cx="1491933" cy="633606"/>
+          </a:xfrm>
+          <a:prstGeom prst="straightConnector1">
+            <a:avLst/>
+          </a:prstGeom>
+          <a:ln>
+            <a:solidFill>
+              <a:schemeClr val="tx1"/>
+            </a:solidFill>
+            <a:prstDash val="dash"/>
+            <a:headEnd type="none" w="med" len="med"/>
+            <a:tailEnd type="arrow" w="med" len="med"/>
+          </a:ln>
+        </p:spPr>
+        <p:style>
+          <a:lnRef idx="1">
+            <a:schemeClr val="accent1"/>
+          </a:lnRef>
+          <a:fillRef idx="0">
+            <a:schemeClr val="accent1"/>
+          </a:fillRef>
+          <a:effectRef idx="0">
+            <a:schemeClr val="accent1"/>
+          </a:effectRef>
+          <a:fontRef idx="minor">
+            <a:schemeClr val="tx1"/>
+          </a:fontRef>
+        </p:style>
+      </p:cxnSp>
+      <p:cxnSp>
+        <p:nvCxnSpPr>
+          <p:cNvPr id="20" name="Straight Arrow Connector 19">
+            <a:extLst>
+              <a:ext uri="{FF2B5EF4-FFF2-40B4-BE49-F238E27FC236}">
+                <a16:creationId xmlns:a16="http://schemas.microsoft.com/office/drawing/2014/main" id="{FF9B8B07-BCFC-C34D-BD6B-E205C617F259}"/>
+              </a:ext>
+            </a:extLst>
+          </p:cNvPr>
+          <p:cNvCxnSpPr>
+            <a:cxnSpLocks/>
+          </p:cNvCxnSpPr>
+          <p:nvPr/>
+        </p:nvCxnSpPr>
+        <p:spPr>
+          <a:xfrm flipV="1">
+            <a:off x="10487266" y="2870522"/>
+            <a:ext cx="0" cy="707883"/>
+          </a:xfrm>
+          <a:prstGeom prst="straightConnector1">
+            <a:avLst/>
+          </a:prstGeom>
+          <a:ln>
+            <a:solidFill>
+              <a:schemeClr val="tx1"/>
+            </a:solidFill>
+            <a:prstDash val="dash"/>
+            <a:headEnd type="none" w="med" len="med"/>
+            <a:tailEnd type="arrow" w="med" len="med"/>
+          </a:ln>
+        </p:spPr>
+        <p:style>
+          <a:lnRef idx="1">
+            <a:schemeClr val="accent1"/>
+          </a:lnRef>
+          <a:fillRef idx="0">
+            <a:schemeClr val="accent1"/>
+          </a:fillRef>
+          <a:effectRef idx="0">
+            <a:schemeClr val="accent1"/>
+          </a:effectRef>
+          <a:fontRef idx="minor">
+            <a:schemeClr val="tx1"/>
+          </a:fontRef>
+        </p:style>
+      </p:cxnSp>
+      <p:sp>
+        <p:nvSpPr>
+          <p:cNvPr id="22" name="TextBox 21">
+            <a:extLst>
+              <a:ext uri="{FF2B5EF4-FFF2-40B4-BE49-F238E27FC236}">
+                <a16:creationId xmlns:a16="http://schemas.microsoft.com/office/drawing/2014/main" id="{A810AB63-900D-9E45-9922-7D9BCFFC27AB}"/>
+              </a:ext>
+            </a:extLst>
+          </p:cNvPr>
+          <p:cNvSpPr txBox="1"/>
+          <p:nvPr/>
+        </p:nvSpPr>
+        <p:spPr>
+          <a:xfrm>
+            <a:off x="10607691" y="3067291"/>
+            <a:ext cx="1145506" cy="276999"/>
+          </a:xfrm>
+          <a:prstGeom prst="rect">
+            <a:avLst/>
+          </a:prstGeom>
+          <a:noFill/>
+        </p:spPr>
+        <p:txBody>
+          <a:bodyPr wrap="none" rtlCol="0">
+            <a:spAutoFit/>
+          </a:bodyPr>
+          <a:lstStyle/>
+          <a:p>
+            <a:r>
+              <a:rPr lang="en-US" sz="1200"/>
+              <a:t>rdfs:subClassOf</a:t>
+            </a:r>
+          </a:p>
+        </p:txBody>
+      </p:sp>
+      <p:sp>
+        <p:nvSpPr>
+          <p:cNvPr id="23" name="Oval 22">
+            <a:extLst>
+              <a:ext uri="{FF2B5EF4-FFF2-40B4-BE49-F238E27FC236}">
+                <a16:creationId xmlns:a16="http://schemas.microsoft.com/office/drawing/2014/main" id="{D79C648D-1F0E-CF43-A1BA-3EA171BECA1D}"/>
+              </a:ext>
+            </a:extLst>
+          </p:cNvPr>
+          <p:cNvSpPr/>
+          <p:nvPr/>
+        </p:nvSpPr>
+        <p:spPr>
+          <a:xfrm>
+            <a:off x="3694126" y="2102971"/>
+            <a:ext cx="1090862" cy="420914"/>
+          </a:xfrm>
+          <a:prstGeom prst="ellipse">
+            <a:avLst/>
+          </a:prstGeom>
+          <a:solidFill>
+            <a:srgbClr val="FFFFD6"/>
+          </a:solidFill>
+          <a:ln>
+            <a:solidFill>
+              <a:schemeClr val="bg1">
+                <a:lumMod val="65000"/>
+              </a:schemeClr>
+            </a:solidFill>
+          </a:ln>
+        </p:spPr>
+        <p:style>
+          <a:lnRef idx="2">
+            <a:schemeClr val="accent1">
+              <a:shade val="50000"/>
+            </a:schemeClr>
+          </a:lnRef>
+          <a:fillRef idx="1">
+            <a:schemeClr val="accent1"/>
+          </a:fillRef>
+          <a:effectRef idx="0">
+            <a:schemeClr val="accent1"/>
+          </a:effectRef>
+          <a:fontRef idx="minor">
+            <a:schemeClr val="lt1"/>
+          </a:fontRef>
+        </p:style>
+        <p:txBody>
+          <a:bodyPr rtlCol="0" anchor="ctr"/>
+          <a:lstStyle/>
+          <a:p>
+            <a:pPr algn="ctr"/>
+            <a:r>
+              <a:rPr lang="en-AU" sz="1100" dirty="0">
+                <a:solidFill>
+                  <a:schemeClr val="tx1"/>
+                </a:solidFill>
+              </a:rPr>
+              <a:t>DigiScape Dataset</a:t>
+            </a:r>
+          </a:p>
+        </p:txBody>
+      </p:sp>
+      <p:cxnSp>
+        <p:nvCxnSpPr>
+          <p:cNvPr id="30" name="Straight Arrow Connector 29">
+            <a:extLst>
+              <a:ext uri="{FF2B5EF4-FFF2-40B4-BE49-F238E27FC236}">
+                <a16:creationId xmlns:a16="http://schemas.microsoft.com/office/drawing/2014/main" id="{500B7DDF-D30B-D14D-AEC7-76C5994BFBF5}"/>
+              </a:ext>
+            </a:extLst>
+          </p:cNvPr>
+          <p:cNvCxnSpPr>
+            <a:cxnSpLocks/>
+            <a:stCxn id="23" idx="0"/>
+            <a:endCxn id="11" idx="4"/>
+          </p:cNvCxnSpPr>
+          <p:nvPr/>
+        </p:nvCxnSpPr>
+        <p:spPr>
+          <a:xfrm flipH="1" flipV="1">
+            <a:off x="4238356" y="1434539"/>
+            <a:ext cx="1201" cy="668432"/>
+          </a:xfrm>
+          <a:prstGeom prst="straightConnector1">
+            <a:avLst/>
+          </a:prstGeom>
+          <a:ln>
+            <a:solidFill>
+              <a:schemeClr val="tx1"/>
+            </a:solidFill>
+            <a:prstDash val="dash"/>
+            <a:headEnd type="none" w="med" len="med"/>
+            <a:tailEnd type="arrow" w="med" len="med"/>
+          </a:ln>
+        </p:spPr>
+        <p:style>
+          <a:lnRef idx="1">
+            <a:schemeClr val="accent1"/>
+          </a:lnRef>
+          <a:fillRef idx="0">
+            <a:schemeClr val="accent1"/>
+          </a:fillRef>
+          <a:effectRef idx="0">
+            <a:schemeClr val="accent1"/>
+          </a:effectRef>
+          <a:fontRef idx="minor">
+            <a:schemeClr val="tx1"/>
+          </a:fontRef>
+        </p:style>
+      </p:cxnSp>
+      <p:sp>
+        <p:nvSpPr>
+          <p:cNvPr id="38" name="Freeform 37">
+            <a:extLst>
+              <a:ext uri="{FF2B5EF4-FFF2-40B4-BE49-F238E27FC236}">
+                <a16:creationId xmlns:a16="http://schemas.microsoft.com/office/drawing/2014/main" id="{0707AFD6-49F5-2545-B4E4-7AE0A7856914}"/>
+              </a:ext>
+            </a:extLst>
+          </p:cNvPr>
+          <p:cNvSpPr/>
+          <p:nvPr/>
+        </p:nvSpPr>
+        <p:spPr>
+          <a:xfrm>
+            <a:off x="6909777" y="2812776"/>
+            <a:ext cx="1095828" cy="689429"/>
+          </a:xfrm>
+          <a:custGeom>
+            <a:avLst/>
+            <a:gdLst>
+              <a:gd name="connsiteX0" fmla="*/ 547914 w 1095828"/>
+              <a:gd name="connsiteY0" fmla="*/ 0 h 689429"/>
+              <a:gd name="connsiteX1" fmla="*/ 1095828 w 1095828"/>
+              <a:gd name="connsiteY1" fmla="*/ 268515 h 689429"/>
+              <a:gd name="connsiteX2" fmla="*/ 1095828 w 1095828"/>
+              <a:gd name="connsiteY2" fmla="*/ 689429 h 689429"/>
+              <a:gd name="connsiteX3" fmla="*/ 0 w 1095828"/>
+              <a:gd name="connsiteY3" fmla="*/ 689429 h 689429"/>
+              <a:gd name="connsiteX4" fmla="*/ 0 w 1095828"/>
+              <a:gd name="connsiteY4" fmla="*/ 268515 h 689429"/>
+            </a:gdLst>
+            <a:ahLst/>
+            <a:cxnLst>
+              <a:cxn ang="0">
+                <a:pos x="connsiteX0" y="connsiteY0"/>
+              </a:cxn>
+              <a:cxn ang="0">
+                <a:pos x="connsiteX1" y="connsiteY1"/>
+              </a:cxn>
+              <a:cxn ang="0">
+                <a:pos x="connsiteX2" y="connsiteY2"/>
+              </a:cxn>
+              <a:cxn ang="0">
+                <a:pos x="connsiteX3" y="connsiteY3"/>
+              </a:cxn>
+              <a:cxn ang="0">
+                <a:pos x="connsiteX4" y="connsiteY4"/>
+              </a:cxn>
+            </a:cxnLst>
+            <a:rect l="l" t="t" r="r" b="b"/>
+            <a:pathLst>
+              <a:path w="1095828" h="689429">
+                <a:moveTo>
+                  <a:pt x="547914" y="0"/>
+                </a:moveTo>
+                <a:lnTo>
+                  <a:pt x="1095828" y="268515"/>
+                </a:lnTo>
+                <a:lnTo>
+                  <a:pt x="1095828" y="689429"/>
+                </a:lnTo>
+                <a:lnTo>
+                  <a:pt x="0" y="689429"/>
+                </a:lnTo>
+                <a:lnTo>
+                  <a:pt x="0" y="268515"/>
+                </a:lnTo>
+                <a:close/>
+              </a:path>
+            </a:pathLst>
+          </a:custGeom>
+          <a:solidFill>
+            <a:srgbClr val="FFD26D"/>
+          </a:solidFill>
+          <a:ln>
+            <a:solidFill>
+              <a:schemeClr val="bg1">
+                <a:lumMod val="65000"/>
+              </a:schemeClr>
+            </a:solidFill>
+          </a:ln>
+        </p:spPr>
+        <p:style>
+          <a:lnRef idx="2">
+            <a:schemeClr val="accent1">
+              <a:shade val="50000"/>
+            </a:schemeClr>
+          </a:lnRef>
+          <a:fillRef idx="1">
+            <a:schemeClr val="accent1"/>
+          </a:fillRef>
+          <a:effectRef idx="0">
+            <a:schemeClr val="accent1"/>
+          </a:effectRef>
+          <a:fontRef idx="minor">
+            <a:schemeClr val="lt1"/>
+          </a:fontRef>
+        </p:style>
+        <p:txBody>
+          <a:bodyPr rtlCol="0" anchor="ctr"/>
+          <a:lstStyle/>
+          <a:p>
+            <a:pPr algn="ctr"/>
+            <a:r>
+              <a:rPr lang="en-AU" sz="1100" dirty="0">
+                <a:solidFill>
+                  <a:schemeClr val="tx1"/>
+                </a:solidFill>
+              </a:rPr>
+              <a:t>DigiScape Reporting System</a:t>
+            </a:r>
+          </a:p>
+        </p:txBody>
+      </p:sp>
+      <p:cxnSp>
+        <p:nvCxnSpPr>
+          <p:cNvPr id="39" name="Straight Arrow Connector 38">
+            <a:extLst>
+              <a:ext uri="{FF2B5EF4-FFF2-40B4-BE49-F238E27FC236}">
+                <a16:creationId xmlns:a16="http://schemas.microsoft.com/office/drawing/2014/main" id="{A55C70FC-3A9A-CB4A-A29D-9D4F7C14E998}"/>
+              </a:ext>
+            </a:extLst>
+          </p:cNvPr>
+          <p:cNvCxnSpPr>
+            <a:cxnSpLocks/>
+            <a:stCxn id="38" idx="0"/>
+          </p:cNvCxnSpPr>
+          <p:nvPr/>
+        </p:nvCxnSpPr>
+        <p:spPr>
+          <a:xfrm flipV="1">
+            <a:off x="7457691" y="1455782"/>
+            <a:ext cx="0" cy="1356994"/>
+          </a:xfrm>
+          <a:prstGeom prst="straightConnector1">
+            <a:avLst/>
+          </a:prstGeom>
+          <a:ln>
+            <a:solidFill>
+              <a:schemeClr val="tx1"/>
+            </a:solidFill>
+            <a:prstDash val="dash"/>
+            <a:headEnd type="none" w="med" len="med"/>
+            <a:tailEnd type="arrow" w="med" len="med"/>
+          </a:ln>
+        </p:spPr>
+        <p:style>
+          <a:lnRef idx="1">
+            <a:schemeClr val="accent1"/>
+          </a:lnRef>
+          <a:fillRef idx="0">
+            <a:schemeClr val="accent1"/>
+          </a:fillRef>
+          <a:effectRef idx="0">
+            <a:schemeClr val="accent1"/>
+          </a:effectRef>
+          <a:fontRef idx="minor">
+            <a:schemeClr val="tx1"/>
+          </a:fontRef>
+        </p:style>
+      </p:cxnSp>
+      <p:sp>
+        <p:nvSpPr>
+          <p:cNvPr id="41" name="Freeform 40">
+            <a:extLst>
+              <a:ext uri="{FF2B5EF4-FFF2-40B4-BE49-F238E27FC236}">
+                <a16:creationId xmlns:a16="http://schemas.microsoft.com/office/drawing/2014/main" id="{C534A6D5-70F5-354D-9A5F-2AA65486F589}"/>
+              </a:ext>
+            </a:extLst>
+          </p:cNvPr>
+          <p:cNvSpPr/>
+          <p:nvPr/>
+        </p:nvSpPr>
+        <p:spPr>
+          <a:xfrm>
+            <a:off x="6909777" y="766353"/>
+            <a:ext cx="1095828" cy="689429"/>
+          </a:xfrm>
+          <a:custGeom>
+            <a:avLst/>
+            <a:gdLst>
+              <a:gd name="connsiteX0" fmla="*/ 547914 w 1095828"/>
+              <a:gd name="connsiteY0" fmla="*/ 0 h 689429"/>
+              <a:gd name="connsiteX1" fmla="*/ 1095828 w 1095828"/>
+              <a:gd name="connsiteY1" fmla="*/ 268515 h 689429"/>
+              <a:gd name="connsiteX2" fmla="*/ 1095828 w 1095828"/>
+              <a:gd name="connsiteY2" fmla="*/ 689429 h 689429"/>
+              <a:gd name="connsiteX3" fmla="*/ 0 w 1095828"/>
+              <a:gd name="connsiteY3" fmla="*/ 689429 h 689429"/>
+              <a:gd name="connsiteX4" fmla="*/ 0 w 1095828"/>
+              <a:gd name="connsiteY4" fmla="*/ 268515 h 689429"/>
+            </a:gdLst>
+            <a:ahLst/>
+            <a:cxnLst>
+              <a:cxn ang="0">
+                <a:pos x="connsiteX0" y="connsiteY0"/>
+              </a:cxn>
+              <a:cxn ang="0">
+                <a:pos x="connsiteX1" y="connsiteY1"/>
+              </a:cxn>
+              <a:cxn ang="0">
+                <a:pos x="connsiteX2" y="connsiteY2"/>
+              </a:cxn>
+              <a:cxn ang="0">
+                <a:pos x="connsiteX3" y="connsiteY3"/>
+              </a:cxn>
+              <a:cxn ang="0">
+                <a:pos x="connsiteX4" y="connsiteY4"/>
+              </a:cxn>
+            </a:cxnLst>
+            <a:rect l="l" t="t" r="r" b="b"/>
+            <a:pathLst>
+              <a:path w="1095828" h="689429">
+                <a:moveTo>
+                  <a:pt x="547914" y="0"/>
+                </a:moveTo>
+                <a:lnTo>
+                  <a:pt x="1095828" y="268515"/>
+                </a:lnTo>
+                <a:lnTo>
+                  <a:pt x="1095828" y="689429"/>
+                </a:lnTo>
+                <a:lnTo>
+                  <a:pt x="0" y="689429"/>
+                </a:lnTo>
+                <a:lnTo>
+                  <a:pt x="0" y="268515"/>
+                </a:lnTo>
+                <a:close/>
+              </a:path>
+            </a:pathLst>
+          </a:custGeom>
+          <a:solidFill>
+            <a:srgbClr val="FFD26D"/>
+          </a:solidFill>
+          <a:ln>
+            <a:solidFill>
+              <a:schemeClr val="bg1">
+                <a:lumMod val="65000"/>
+              </a:schemeClr>
+            </a:solidFill>
+          </a:ln>
+        </p:spPr>
+        <p:style>
+          <a:lnRef idx="2">
+            <a:schemeClr val="accent1">
+              <a:shade val="50000"/>
+            </a:schemeClr>
+          </a:lnRef>
+          <a:fillRef idx="1">
+            <a:schemeClr val="accent1"/>
+          </a:fillRef>
+          <a:effectRef idx="0">
+            <a:schemeClr val="accent1"/>
+          </a:effectRef>
+          <a:fontRef idx="minor">
+            <a:schemeClr val="lt1"/>
+          </a:fontRef>
+        </p:style>
+        <p:txBody>
+          <a:bodyPr rtlCol="0" anchor="ctr"/>
+          <a:lstStyle/>
+          <a:p>
+            <a:pPr algn="ctr"/>
+            <a:r>
+              <a:rPr lang="en-AU" sz="1100" dirty="0">
+                <a:solidFill>
+                  <a:schemeClr val="tx1"/>
+                </a:solidFill>
+              </a:rPr>
+              <a:t>PROMS Reporting System</a:t>
+            </a:r>
+          </a:p>
+        </p:txBody>
+      </p:sp>
+    </p:spTree>
+    <p:extLst>
+      <p:ext uri="{BB962C8B-B14F-4D97-AF65-F5344CB8AC3E}">
+        <p14:creationId xmlns:p14="http://schemas.microsoft.com/office/powerpoint/2010/main" val="1886163376"/>
+      </p:ext>
+    </p:extLst>
+  </p:cSld>
+  <p:clrMapOvr>
+    <a:masterClrMapping/>
+  </p:clrMapOvr>
 </p:sld>
 </file>
 

</xml_diff>